<commit_message>
Minimum safe altitudes update
</commit_message>
<xml_diff>
--- a/ui/docs/Tiles.pptx
+++ b/ui/docs/Tiles.pptx
@@ -216,7 +216,7 @@
           <a:p>
             <a:fld id="{33ED5609-1730-904A-B815-DF633E0B1232}" type="datetimeFigureOut">
               <a:rPr lang="en-US" smtClean="0"/>
-              <a:t>1/18/26</a:t>
+              <a:t>1/20/26</a:t>
             </a:fld>
             <a:endParaRPr lang="en-US"/>
           </a:p>
@@ -822,7 +822,7 @@
           <a:p>
             <a:fld id="{46DA5C4A-B072-FB48-84F0-865EE8F0D843}" type="datetimeFigureOut">
               <a:rPr lang="en-US" smtClean="0"/>
-              <a:t>1/18/26</a:t>
+              <a:t>1/20/26</a:t>
             </a:fld>
             <a:endParaRPr lang="en-US"/>
           </a:p>
@@ -1020,7 +1020,7 @@
           <a:p>
             <a:fld id="{46DA5C4A-B072-FB48-84F0-865EE8F0D843}" type="datetimeFigureOut">
               <a:rPr lang="en-US" smtClean="0"/>
-              <a:t>1/18/26</a:t>
+              <a:t>1/20/26</a:t>
             </a:fld>
             <a:endParaRPr lang="en-US"/>
           </a:p>
@@ -1228,7 +1228,7 @@
           <a:p>
             <a:fld id="{46DA5C4A-B072-FB48-84F0-865EE8F0D843}" type="datetimeFigureOut">
               <a:rPr lang="en-US" smtClean="0"/>
-              <a:t>1/18/26</a:t>
+              <a:t>1/20/26</a:t>
             </a:fld>
             <a:endParaRPr lang="en-US"/>
           </a:p>
@@ -1426,7 +1426,7 @@
           <a:p>
             <a:fld id="{46DA5C4A-B072-FB48-84F0-865EE8F0D843}" type="datetimeFigureOut">
               <a:rPr lang="en-US" smtClean="0"/>
-              <a:t>1/18/26</a:t>
+              <a:t>1/20/26</a:t>
             </a:fld>
             <a:endParaRPr lang="en-US"/>
           </a:p>
@@ -1701,7 +1701,7 @@
           <a:p>
             <a:fld id="{46DA5C4A-B072-FB48-84F0-865EE8F0D843}" type="datetimeFigureOut">
               <a:rPr lang="en-US" smtClean="0"/>
-              <a:t>1/18/26</a:t>
+              <a:t>1/20/26</a:t>
             </a:fld>
             <a:endParaRPr lang="en-US"/>
           </a:p>
@@ -1966,7 +1966,7 @@
           <a:p>
             <a:fld id="{46DA5C4A-B072-FB48-84F0-865EE8F0D843}" type="datetimeFigureOut">
               <a:rPr lang="en-US" smtClean="0"/>
-              <a:t>1/18/26</a:t>
+              <a:t>1/20/26</a:t>
             </a:fld>
             <a:endParaRPr lang="en-US"/>
           </a:p>
@@ -2378,7 +2378,7 @@
           <a:p>
             <a:fld id="{46DA5C4A-B072-FB48-84F0-865EE8F0D843}" type="datetimeFigureOut">
               <a:rPr lang="en-US" smtClean="0"/>
-              <a:t>1/18/26</a:t>
+              <a:t>1/20/26</a:t>
             </a:fld>
             <a:endParaRPr lang="en-US"/>
           </a:p>
@@ -2519,7 +2519,7 @@
           <a:p>
             <a:fld id="{46DA5C4A-B072-FB48-84F0-865EE8F0D843}" type="datetimeFigureOut">
               <a:rPr lang="en-US" smtClean="0"/>
-              <a:t>1/18/26</a:t>
+              <a:t>1/20/26</a:t>
             </a:fld>
             <a:endParaRPr lang="en-US"/>
           </a:p>
@@ -2632,7 +2632,7 @@
           <a:p>
             <a:fld id="{46DA5C4A-B072-FB48-84F0-865EE8F0D843}" type="datetimeFigureOut">
               <a:rPr lang="en-US" smtClean="0"/>
-              <a:t>1/18/26</a:t>
+              <a:t>1/20/26</a:t>
             </a:fld>
             <a:endParaRPr lang="en-US"/>
           </a:p>
@@ -2943,7 +2943,7 @@
           <a:p>
             <a:fld id="{46DA5C4A-B072-FB48-84F0-865EE8F0D843}" type="datetimeFigureOut">
               <a:rPr lang="en-US" smtClean="0"/>
-              <a:t>1/18/26</a:t>
+              <a:t>1/20/26</a:t>
             </a:fld>
             <a:endParaRPr lang="en-US"/>
           </a:p>
@@ -3231,7 +3231,7 @@
           <a:p>
             <a:fld id="{46DA5C4A-B072-FB48-84F0-865EE8F0D843}" type="datetimeFigureOut">
               <a:rPr lang="en-US" smtClean="0"/>
-              <a:t>1/18/26</a:t>
+              <a:t>1/20/26</a:t>
             </a:fld>
             <a:endParaRPr lang="en-US"/>
           </a:p>
@@ -3472,7 +3472,7 @@
           <a:p>
             <a:fld id="{46DA5C4A-B072-FB48-84F0-865EE8F0D843}" type="datetimeFigureOut">
               <a:rPr lang="en-US" smtClean="0"/>
-              <a:t>1/18/26</a:t>
+              <a:t>1/20/26</a:t>
             </a:fld>
             <a:endParaRPr lang="en-US"/>
           </a:p>
@@ -4548,8 +4548,8 @@
         </p:nvSpPr>
         <p:spPr>
           <a:xfrm>
-            <a:off x="4359442" y="2695260"/>
-            <a:ext cx="274380" cy="261610"/>
+            <a:off x="4359442" y="2678326"/>
+            <a:ext cx="274380" cy="307777"/>
           </a:xfrm>
           <a:prstGeom prst="rect">
             <a:avLst/>
@@ -4564,10 +4564,10 @@
           <a:p>
             <a:pPr algn="ctr"/>
             <a:r>
-              <a:rPr lang="en-US" sz="1100" dirty="0"/>
+              <a:rPr lang="en-US" sz="1400" dirty="0"/>
               <a:t>N</a:t>
             </a:r>
-            <a:endParaRPr lang="en-US" sz="1050" dirty="0"/>
+            <a:endParaRPr lang="en-US" sz="1200" dirty="0"/>
           </a:p>
         </p:txBody>
       </p:sp>
@@ -4585,8 +4585,8 @@
         </p:nvSpPr>
         <p:spPr>
           <a:xfrm>
-            <a:off x="4285011" y="3958466"/>
-            <a:ext cx="274380" cy="261610"/>
+            <a:off x="4285011" y="3924598"/>
+            <a:ext cx="274380" cy="338554"/>
           </a:xfrm>
           <a:prstGeom prst="rect">
             <a:avLst/>
@@ -4601,10 +4601,10 @@
           <a:p>
             <a:pPr algn="ctr"/>
             <a:r>
-              <a:rPr lang="en-US" sz="1100" dirty="0"/>
+              <a:rPr lang="en-US" sz="1600" dirty="0"/>
               <a:t>N</a:t>
             </a:r>
-            <a:endParaRPr lang="en-US" sz="1050" dirty="0"/>
+            <a:endParaRPr lang="en-US" sz="1400" dirty="0"/>
           </a:p>
         </p:txBody>
       </p:sp>
@@ -7205,10 +7205,10 @@
       </p:sp>
       <p:sp>
         <p:nvSpPr>
-          <p:cNvPr id="7" name="TextBox 6">
-            <a:extLst>
-              <a:ext uri="{FF2B5EF4-FFF2-40B4-BE49-F238E27FC236}">
-                <a16:creationId xmlns:a16="http://schemas.microsoft.com/office/drawing/2014/main" id="{29888067-135E-5C69-D964-4F62C2E8DF88}"/>
+          <p:cNvPr id="17" name="TextBox 16">
+            <a:extLst>
+              <a:ext uri="{FF2B5EF4-FFF2-40B4-BE49-F238E27FC236}">
+                <a16:creationId xmlns:a16="http://schemas.microsoft.com/office/drawing/2014/main" id="{91B0FA93-B9CF-B895-2464-7FFA2E509FC5}"/>
               </a:ext>
             </a:extLst>
           </p:cNvPr>
@@ -7217,86 +7217,7 @@
         </p:nvSpPr>
         <p:spPr>
           <a:xfrm>
-            <a:off x="3561907" y="4664467"/>
-            <a:ext cx="1256044" cy="461665"/>
-          </a:xfrm>
-          <a:prstGeom prst="rect">
-            <a:avLst/>
-          </a:prstGeom>
-          <a:noFill/>
-        </p:spPr>
-        <p:txBody>
-          <a:bodyPr wrap="square" rtlCol="0">
-            <a:spAutoFit/>
-          </a:bodyPr>
-          <a:lstStyle/>
-          <a:p>
-            <a:r>
-              <a:rPr lang="en-US" sz="2400" b="1" dirty="0">
-                <a:solidFill>
-                  <a:schemeClr val="bg1"/>
-                </a:solidFill>
-              </a:rPr>
-              <a:t>500ft</a:t>
-            </a:r>
-          </a:p>
-        </p:txBody>
-      </p:sp>
-      <p:sp>
-        <p:nvSpPr>
-          <p:cNvPr id="8" name="TextBox 7">
-            <a:extLst>
-              <a:ext uri="{FF2B5EF4-FFF2-40B4-BE49-F238E27FC236}">
-                <a16:creationId xmlns:a16="http://schemas.microsoft.com/office/drawing/2014/main" id="{43857410-927D-16F6-2DA0-172236402200}"/>
-              </a:ext>
-            </a:extLst>
-          </p:cNvPr>
-          <p:cNvSpPr txBox="1"/>
-          <p:nvPr/>
-        </p:nvSpPr>
-        <p:spPr>
-          <a:xfrm rot="5400000">
-            <a:off x="4269589" y="5085447"/>
-            <a:ext cx="1256044" cy="461665"/>
-          </a:xfrm>
-          <a:prstGeom prst="rect">
-            <a:avLst/>
-          </a:prstGeom>
-          <a:noFill/>
-        </p:spPr>
-        <p:txBody>
-          <a:bodyPr wrap="square" rtlCol="0">
-            <a:spAutoFit/>
-          </a:bodyPr>
-          <a:lstStyle/>
-          <a:p>
-            <a:pPr algn="r"/>
-            <a:r>
-              <a:rPr lang="en-US" sz="2400" b="1" dirty="0">
-                <a:solidFill>
-                  <a:schemeClr val="bg1"/>
-                </a:solidFill>
-              </a:rPr>
-              <a:t>1sm</a:t>
-            </a:r>
-          </a:p>
-        </p:txBody>
-      </p:sp>
-      <p:sp>
-        <p:nvSpPr>
-          <p:cNvPr id="17" name="TextBox 16">
-            <a:extLst>
-              <a:ext uri="{FF2B5EF4-FFF2-40B4-BE49-F238E27FC236}">
-                <a16:creationId xmlns:a16="http://schemas.microsoft.com/office/drawing/2014/main" id="{91B0FA93-B9CF-B895-2464-7FFA2E509FC5}"/>
-              </a:ext>
-            </a:extLst>
-          </p:cNvPr>
-          <p:cNvSpPr txBox="1"/>
-          <p:nvPr/>
-        </p:nvSpPr>
-        <p:spPr>
-          <a:xfrm>
-            <a:off x="6429168" y="3097581"/>
+            <a:off x="6429168" y="2279992"/>
             <a:ext cx="1256044" cy="461665"/>
           </a:xfrm>
           <a:prstGeom prst="rect">
@@ -7337,7 +7258,7 @@
         </p:nvSpPr>
         <p:spPr>
           <a:xfrm>
-            <a:off x="3760396" y="3159136"/>
+            <a:off x="3760396" y="2341547"/>
             <a:ext cx="1491828" cy="400110"/>
           </a:xfrm>
           <a:prstGeom prst="rect">
@@ -7383,7 +7304,7 @@
         </p:nvCxnSpPr>
         <p:spPr>
           <a:xfrm>
-            <a:off x="5252224" y="3359191"/>
+            <a:off x="5252224" y="2541602"/>
             <a:ext cx="1103971" cy="0"/>
           </a:xfrm>
           <a:prstGeom prst="straightConnector1">
@@ -7423,13 +7344,14 @@
           <p:cNvCxnSpPr>
             <a:cxnSpLocks/>
             <a:stCxn id="3" idx="2"/>
+            <a:endCxn id="5" idx="0"/>
           </p:cNvCxnSpPr>
           <p:nvPr/>
         </p:nvCxnSpPr>
         <p:spPr>
           <a:xfrm>
-            <a:off x="4506310" y="3559246"/>
-            <a:ext cx="0" cy="1129011"/>
+            <a:off x="4506310" y="2741657"/>
+            <a:ext cx="0" cy="1158690"/>
           </a:xfrm>
           <a:prstGeom prst="straightConnector1">
             <a:avLst/>
@@ -7470,8 +7392,8 @@
         </p:nvSpPr>
         <p:spPr>
           <a:xfrm>
-            <a:off x="5252224" y="3052000"/>
-            <a:ext cx="274380" cy="261610"/>
+            <a:off x="5269158" y="2234411"/>
+            <a:ext cx="274380" cy="338554"/>
           </a:xfrm>
           <a:prstGeom prst="rect">
             <a:avLst/>
@@ -7486,10 +7408,10 @@
           <a:p>
             <a:pPr algn="ctr"/>
             <a:r>
-              <a:rPr lang="en-US" sz="1100" dirty="0"/>
+              <a:rPr lang="en-US" sz="1600" dirty="0"/>
               <a:t>Y</a:t>
             </a:r>
-            <a:endParaRPr lang="en-US" sz="1050" dirty="0"/>
+            <a:endParaRPr lang="en-US" sz="1400" dirty="0"/>
           </a:p>
         </p:txBody>
       </p:sp>
@@ -7507,8 +7429,8 @@
         </p:nvSpPr>
         <p:spPr>
           <a:xfrm>
-            <a:off x="4054889" y="3666382"/>
-            <a:ext cx="274380" cy="261610"/>
+            <a:off x="4162467" y="2805762"/>
+            <a:ext cx="274380" cy="338554"/>
           </a:xfrm>
           <a:prstGeom prst="rect">
             <a:avLst/>
@@ -7523,10 +7445,10 @@
           <a:p>
             <a:pPr algn="ctr"/>
             <a:r>
-              <a:rPr lang="en-US" sz="1100" dirty="0"/>
+              <a:rPr lang="en-US" sz="1600" dirty="0"/>
               <a:t>N</a:t>
             </a:r>
-            <a:endParaRPr lang="en-US" sz="1050" dirty="0"/>
+            <a:endParaRPr lang="en-US" sz="1400" dirty="0"/>
           </a:p>
         </p:txBody>
       </p:sp>
@@ -7544,8 +7466,8 @@
         </p:nvSpPr>
         <p:spPr>
           <a:xfrm>
-            <a:off x="3760395" y="1794218"/>
-            <a:ext cx="4000853" cy="1015663"/>
+            <a:off x="3657600" y="1611332"/>
+            <a:ext cx="4195481" cy="646331"/>
           </a:xfrm>
           <a:prstGeom prst="rect">
             <a:avLst/>
@@ -7559,22 +7481,22 @@
           <a:lstStyle/>
           <a:p>
             <a:r>
-              <a:rPr lang="en-US" sz="2000" b="1" dirty="0"/>
+              <a:rPr lang="en-US" b="1" dirty="0"/>
               <a:t>Anywhere: </a:t>
             </a:r>
             <a:r>
-              <a:rPr lang="en-US" sz="2000" dirty="0"/>
-              <a:t>Allows safe emergency landing without undue hazard to people or property on the surface</a:t>
-            </a:r>
-          </a:p>
-        </p:txBody>
-      </p:sp>
-      <p:sp>
-        <p:nvSpPr>
-          <p:cNvPr id="23" name="TextBox 22">
-            <a:extLst>
-              <a:ext uri="{FF2B5EF4-FFF2-40B4-BE49-F238E27FC236}">
-                <a16:creationId xmlns:a16="http://schemas.microsoft.com/office/drawing/2014/main" id="{AB61C64D-1B8A-7AF6-444D-5BD0706AFA74}"/>
+              <a:rPr lang="en-US" dirty="0"/>
+              <a:t>Allows safe emergency landing w/o hazard to people or property</a:t>
+            </a:r>
+          </a:p>
+        </p:txBody>
+      </p:sp>
+      <p:sp>
+        <p:nvSpPr>
+          <p:cNvPr id="25" name="TextBox 24">
+            <a:extLst>
+              <a:ext uri="{FF2B5EF4-FFF2-40B4-BE49-F238E27FC236}">
+                <a16:creationId xmlns:a16="http://schemas.microsoft.com/office/drawing/2014/main" id="{AA60C9B2-60B7-E2D1-0121-4A43D3944078}"/>
               </a:ext>
             </a:extLst>
           </p:cNvPr>
@@ -7583,8 +7505,8 @@
         </p:nvSpPr>
         <p:spPr>
           <a:xfrm>
-            <a:off x="3878288" y="4800488"/>
-            <a:ext cx="1256044" cy="461665"/>
+            <a:off x="6491464" y="2652421"/>
+            <a:ext cx="938228" cy="338554"/>
           </a:xfrm>
           <a:prstGeom prst="rect">
             <a:avLst/>
@@ -7599,15 +7521,154 @@
           <a:p>
             <a:pPr algn="ctr"/>
             <a:r>
-              <a:rPr lang="en-US" sz="2400" b="1" dirty="0">
-                <a:solidFill>
-                  <a:schemeClr val="accent1">
-                    <a:lumMod val="75000"/>
-                  </a:schemeClr>
-                </a:solidFill>
-              </a:rPr>
-              <a:t>500ft</a:t>
-            </a:r>
+              <a:rPr lang="en-US" sz="1600" dirty="0"/>
+              <a:t>Above</a:t>
+            </a:r>
+            <a:endParaRPr lang="en-US" sz="1400" dirty="0"/>
+          </a:p>
+        </p:txBody>
+      </p:sp>
+      <p:grpSp>
+        <p:nvGrpSpPr>
+          <p:cNvPr id="37" name="Group 36">
+            <a:extLst>
+              <a:ext uri="{FF2B5EF4-FFF2-40B4-BE49-F238E27FC236}">
+                <a16:creationId xmlns:a16="http://schemas.microsoft.com/office/drawing/2014/main" id="{62BB57D3-6C62-91E0-E466-EABABB1CAB2A}"/>
+              </a:ext>
+            </a:extLst>
+          </p:cNvPr>
+          <p:cNvGrpSpPr/>
+          <p:nvPr/>
+        </p:nvGrpSpPr>
+        <p:grpSpPr>
+          <a:xfrm>
+            <a:off x="3760396" y="5161733"/>
+            <a:ext cx="1491828" cy="634618"/>
+            <a:chOff x="6289301" y="3792837"/>
+            <a:chExt cx="1491828" cy="634618"/>
+          </a:xfrm>
+        </p:grpSpPr>
+        <p:sp>
+          <p:nvSpPr>
+            <p:cNvPr id="23" name="TextBox 22">
+              <a:extLst>
+                <a:ext uri="{FF2B5EF4-FFF2-40B4-BE49-F238E27FC236}">
+                  <a16:creationId xmlns:a16="http://schemas.microsoft.com/office/drawing/2014/main" id="{AB61C64D-1B8A-7AF6-444D-5BD0706AFA74}"/>
+                </a:ext>
+              </a:extLst>
+            </p:cNvPr>
+            <p:cNvSpPr txBox="1"/>
+            <p:nvPr/>
+          </p:nvSpPr>
+          <p:spPr>
+            <a:xfrm>
+              <a:off x="6407193" y="3792837"/>
+              <a:ext cx="1256044" cy="461665"/>
+            </a:xfrm>
+            <a:prstGeom prst="rect">
+              <a:avLst/>
+            </a:prstGeom>
+            <a:noFill/>
+          </p:spPr>
+          <p:txBody>
+            <a:bodyPr wrap="square" rtlCol="0">
+              <a:spAutoFit/>
+            </a:bodyPr>
+            <a:lstStyle/>
+            <a:p>
+              <a:pPr algn="ctr"/>
+              <a:r>
+                <a:rPr lang="en-US" sz="2400" b="1" dirty="0">
+                  <a:solidFill>
+                    <a:schemeClr val="accent1">
+                      <a:lumMod val="75000"/>
+                    </a:schemeClr>
+                  </a:solidFill>
+                </a:rPr>
+                <a:t>500ft</a:t>
+              </a:r>
+            </a:p>
+          </p:txBody>
+        </p:sp>
+        <p:sp>
+          <p:nvSpPr>
+            <p:cNvPr id="26" name="TextBox 25">
+              <a:extLst>
+                <a:ext uri="{FF2B5EF4-FFF2-40B4-BE49-F238E27FC236}">
+                  <a16:creationId xmlns:a16="http://schemas.microsoft.com/office/drawing/2014/main" id="{7D3EFCB8-DACE-D840-E98E-918B1DE25CE6}"/>
+                </a:ext>
+              </a:extLst>
+            </p:cNvPr>
+            <p:cNvSpPr txBox="1"/>
+            <p:nvPr/>
+          </p:nvSpPr>
+          <p:spPr>
+            <a:xfrm>
+              <a:off x="6289301" y="4088901"/>
+              <a:ext cx="1491828" cy="338554"/>
+            </a:xfrm>
+            <a:prstGeom prst="rect">
+              <a:avLst/>
+            </a:prstGeom>
+            <a:noFill/>
+          </p:spPr>
+          <p:txBody>
+            <a:bodyPr wrap="square" rtlCol="0">
+              <a:spAutoFit/>
+            </a:bodyPr>
+            <a:lstStyle/>
+            <a:p>
+              <a:pPr algn="ctr"/>
+              <a:r>
+                <a:rPr lang="en-US" sz="1600" dirty="0"/>
+                <a:t>Above Surface</a:t>
+              </a:r>
+              <a:endParaRPr lang="en-US" sz="1400" dirty="0"/>
+            </a:p>
+          </p:txBody>
+        </p:sp>
+      </p:grpSp>
+      <p:sp>
+        <p:nvSpPr>
+          <p:cNvPr id="27" name="TextBox 26">
+            <a:extLst>
+              <a:ext uri="{FF2B5EF4-FFF2-40B4-BE49-F238E27FC236}">
+                <a16:creationId xmlns:a16="http://schemas.microsoft.com/office/drawing/2014/main" id="{AA81FB32-2570-7150-CEA3-8FF4D5D53C03}"/>
+              </a:ext>
+            </a:extLst>
+          </p:cNvPr>
+          <p:cNvSpPr txBox="1"/>
+          <p:nvPr/>
+        </p:nvSpPr>
+        <p:spPr>
+          <a:xfrm>
+            <a:off x="5597908" y="2840254"/>
+            <a:ext cx="1118677" cy="584775"/>
+          </a:xfrm>
+          <a:prstGeom prst="rect">
+            <a:avLst/>
+          </a:prstGeom>
+          <a:noFill/>
+        </p:spPr>
+        <p:txBody>
+          <a:bodyPr wrap="square" rtlCol="0">
+            <a:spAutoFit/>
+          </a:bodyPr>
+          <a:lstStyle/>
+          <a:p>
+            <a:pPr algn="ctr"/>
+            <a:r>
+              <a:rPr lang="en-US" sz="1600" dirty="0"/>
+              <a:t>2,000ft</a:t>
+            </a:r>
+          </a:p>
+          <a:p>
+            <a:pPr algn="ctr"/>
+            <a:r>
+              <a:rPr lang="en-US" sz="1600" dirty="0"/>
+              <a:t>Radius</a:t>
+            </a:r>
+            <a:endParaRPr lang="en-US" sz="1400" dirty="0"/>
           </a:p>
         </p:txBody>
       </p:sp>
@@ -7625,8 +7686,8 @@
         </p:nvSpPr>
         <p:spPr>
           <a:xfrm>
-            <a:off x="6432723" y="3746705"/>
-            <a:ext cx="1092820" cy="1209518"/>
+            <a:off x="6594093" y="2692440"/>
+            <a:ext cx="732971" cy="846818"/>
           </a:xfrm>
           <a:prstGeom prst="flowChartMagneticDisk">
             <a:avLst/>
@@ -7662,124 +7723,6 @@
           </a:p>
         </p:txBody>
       </p:sp>
-      <p:sp>
-        <p:nvSpPr>
-          <p:cNvPr id="25" name="TextBox 24">
-            <a:extLst>
-              <a:ext uri="{FF2B5EF4-FFF2-40B4-BE49-F238E27FC236}">
-                <a16:creationId xmlns:a16="http://schemas.microsoft.com/office/drawing/2014/main" id="{AA60C9B2-60B7-E2D1-0121-4A43D3944078}"/>
-              </a:ext>
-            </a:extLst>
-          </p:cNvPr>
-          <p:cNvSpPr txBox="1"/>
-          <p:nvPr/>
-        </p:nvSpPr>
-        <p:spPr>
-          <a:xfrm>
-            <a:off x="6510781" y="3428441"/>
-            <a:ext cx="938228" cy="338554"/>
-          </a:xfrm>
-          <a:prstGeom prst="rect">
-            <a:avLst/>
-          </a:prstGeom>
-          <a:noFill/>
-        </p:spPr>
-        <p:txBody>
-          <a:bodyPr wrap="square" rtlCol="0">
-            <a:spAutoFit/>
-          </a:bodyPr>
-          <a:lstStyle/>
-          <a:p>
-            <a:pPr algn="ctr"/>
-            <a:r>
-              <a:rPr lang="en-US" sz="1600" dirty="0"/>
-              <a:t>Above</a:t>
-            </a:r>
-            <a:endParaRPr lang="en-US" sz="1400" dirty="0"/>
-          </a:p>
-        </p:txBody>
-      </p:sp>
-      <p:sp>
-        <p:nvSpPr>
-          <p:cNvPr id="26" name="TextBox 25">
-            <a:extLst>
-              <a:ext uri="{FF2B5EF4-FFF2-40B4-BE49-F238E27FC236}">
-                <a16:creationId xmlns:a16="http://schemas.microsoft.com/office/drawing/2014/main" id="{7D3EFCB8-DACE-D840-E98E-918B1DE25CE6}"/>
-              </a:ext>
-            </a:extLst>
-          </p:cNvPr>
-          <p:cNvSpPr txBox="1"/>
-          <p:nvPr/>
-        </p:nvSpPr>
-        <p:spPr>
-          <a:xfrm>
-            <a:off x="3754267" y="5160912"/>
-            <a:ext cx="1491828" cy="338554"/>
-          </a:xfrm>
-          <a:prstGeom prst="rect">
-            <a:avLst/>
-          </a:prstGeom>
-          <a:noFill/>
-        </p:spPr>
-        <p:txBody>
-          <a:bodyPr wrap="square" rtlCol="0">
-            <a:spAutoFit/>
-          </a:bodyPr>
-          <a:lstStyle/>
-          <a:p>
-            <a:pPr algn="ctr"/>
-            <a:r>
-              <a:rPr lang="en-US" sz="1600" dirty="0"/>
-              <a:t>Above Surface</a:t>
-            </a:r>
-            <a:endParaRPr lang="en-US" sz="1400" dirty="0"/>
-          </a:p>
-        </p:txBody>
-      </p:sp>
-      <p:sp>
-        <p:nvSpPr>
-          <p:cNvPr id="27" name="TextBox 26">
-            <a:extLst>
-              <a:ext uri="{FF2B5EF4-FFF2-40B4-BE49-F238E27FC236}">
-                <a16:creationId xmlns:a16="http://schemas.microsoft.com/office/drawing/2014/main" id="{AA81FB32-2570-7150-CEA3-8FF4D5D53C03}"/>
-              </a:ext>
-            </a:extLst>
-          </p:cNvPr>
-          <p:cNvSpPr txBox="1"/>
-          <p:nvPr/>
-        </p:nvSpPr>
-        <p:spPr>
-          <a:xfrm>
-            <a:off x="6429167" y="4956223"/>
-            <a:ext cx="1118677" cy="584775"/>
-          </a:xfrm>
-          <a:prstGeom prst="rect">
-            <a:avLst/>
-          </a:prstGeom>
-          <a:noFill/>
-        </p:spPr>
-        <p:txBody>
-          <a:bodyPr wrap="square" rtlCol="0">
-            <a:spAutoFit/>
-          </a:bodyPr>
-          <a:lstStyle/>
-          <a:p>
-            <a:pPr algn="ctr"/>
-            <a:r>
-              <a:rPr lang="en-US" sz="1600" dirty="0"/>
-              <a:t>2,000ft</a:t>
-            </a:r>
-          </a:p>
-          <a:p>
-            <a:pPr algn="ctr"/>
-            <a:r>
-              <a:rPr lang="en-US" sz="1600" dirty="0"/>
-              <a:t>Radius</a:t>
-            </a:r>
-            <a:endParaRPr lang="en-US" sz="1400" dirty="0"/>
-          </a:p>
-        </p:txBody>
-      </p:sp>
       <p:pic>
         <p:nvPicPr>
           <p:cNvPr id="28" name="Picture 27">
@@ -7802,14 +7745,424 @@
         </p:blipFill>
         <p:spPr>
           <a:xfrm>
-            <a:off x="6556443" y="4019798"/>
-            <a:ext cx="842986" cy="1008183"/>
+            <a:off x="6664024" y="2900986"/>
+            <a:ext cx="609278" cy="722734"/>
           </a:xfrm>
           <a:prstGeom prst="rect">
             <a:avLst/>
           </a:prstGeom>
         </p:spPr>
       </p:pic>
+      <p:sp>
+        <p:nvSpPr>
+          <p:cNvPr id="5" name="TextBox 4">
+            <a:extLst>
+              <a:ext uri="{FF2B5EF4-FFF2-40B4-BE49-F238E27FC236}">
+                <a16:creationId xmlns:a16="http://schemas.microsoft.com/office/drawing/2014/main" id="{4E9EB17B-BD47-B360-013F-BB83AEFF33B1}"/>
+              </a:ext>
+            </a:extLst>
+          </p:cNvPr>
+          <p:cNvSpPr txBox="1"/>
+          <p:nvPr/>
+        </p:nvSpPr>
+        <p:spPr>
+          <a:xfrm>
+            <a:off x="3760396" y="3900347"/>
+            <a:ext cx="1491828" cy="584775"/>
+          </a:xfrm>
+          <a:prstGeom prst="rect">
+            <a:avLst/>
+          </a:prstGeom>
+          <a:solidFill>
+            <a:srgbClr val="FFFFBE"/>
+          </a:solidFill>
+          <a:ln w="19050">
+            <a:solidFill>
+              <a:schemeClr val="tx1"/>
+            </a:solidFill>
+          </a:ln>
+        </p:spPr>
+        <p:txBody>
+          <a:bodyPr wrap="square" rtlCol="0">
+            <a:spAutoFit/>
+          </a:bodyPr>
+          <a:lstStyle/>
+          <a:p>
+            <a:pPr algn="ctr"/>
+            <a:r>
+              <a:rPr lang="en-US" sz="1600" dirty="0"/>
+              <a:t>Water or sparsely pop.</a:t>
+            </a:r>
+          </a:p>
+        </p:txBody>
+      </p:sp>
+      <p:cxnSp>
+        <p:nvCxnSpPr>
+          <p:cNvPr id="13" name="Straight Arrow Connector 12">
+            <a:extLst>
+              <a:ext uri="{FF2B5EF4-FFF2-40B4-BE49-F238E27FC236}">
+                <a16:creationId xmlns:a16="http://schemas.microsoft.com/office/drawing/2014/main" id="{F47A9646-DE11-90D7-EE76-E767127842AA}"/>
+              </a:ext>
+            </a:extLst>
+          </p:cNvPr>
+          <p:cNvCxnSpPr>
+            <a:cxnSpLocks/>
+          </p:cNvCxnSpPr>
+          <p:nvPr/>
+        </p:nvCxnSpPr>
+        <p:spPr>
+          <a:xfrm>
+            <a:off x="5252224" y="4173720"/>
+            <a:ext cx="1103971" cy="0"/>
+          </a:xfrm>
+          <a:prstGeom prst="straightConnector1">
+            <a:avLst/>
+          </a:prstGeom>
+          <a:ln w="63500">
+            <a:solidFill>
+              <a:schemeClr val="accent3"/>
+            </a:solidFill>
+            <a:tailEnd type="triangle"/>
+          </a:ln>
+        </p:spPr>
+        <p:style>
+          <a:lnRef idx="2">
+            <a:schemeClr val="accent1"/>
+          </a:lnRef>
+          <a:fillRef idx="0">
+            <a:schemeClr val="accent1"/>
+          </a:fillRef>
+          <a:effectRef idx="1">
+            <a:schemeClr val="accent1"/>
+          </a:effectRef>
+          <a:fontRef idx="minor">
+            <a:schemeClr val="tx1"/>
+          </a:fontRef>
+        </p:style>
+      </p:cxnSp>
+      <p:sp>
+        <p:nvSpPr>
+          <p:cNvPr id="14" name="TextBox 13">
+            <a:extLst>
+              <a:ext uri="{FF2B5EF4-FFF2-40B4-BE49-F238E27FC236}">
+                <a16:creationId xmlns:a16="http://schemas.microsoft.com/office/drawing/2014/main" id="{D71C5971-B29D-ED86-A182-F66616A5245C}"/>
+              </a:ext>
+            </a:extLst>
+          </p:cNvPr>
+          <p:cNvSpPr txBox="1"/>
+          <p:nvPr/>
+        </p:nvSpPr>
+        <p:spPr>
+          <a:xfrm>
+            <a:off x="5269158" y="3866529"/>
+            <a:ext cx="274380" cy="338554"/>
+          </a:xfrm>
+          <a:prstGeom prst="rect">
+            <a:avLst/>
+          </a:prstGeom>
+          <a:noFill/>
+        </p:spPr>
+        <p:txBody>
+          <a:bodyPr wrap="square" rtlCol="0">
+            <a:spAutoFit/>
+          </a:bodyPr>
+          <a:lstStyle/>
+          <a:p>
+            <a:pPr algn="ctr"/>
+            <a:r>
+              <a:rPr lang="en-US" sz="1600" dirty="0"/>
+              <a:t>Y</a:t>
+            </a:r>
+            <a:endParaRPr lang="en-US" sz="1400" dirty="0"/>
+          </a:p>
+        </p:txBody>
+      </p:sp>
+      <p:sp>
+        <p:nvSpPr>
+          <p:cNvPr id="15" name="TextBox 14">
+            <a:extLst>
+              <a:ext uri="{FF2B5EF4-FFF2-40B4-BE49-F238E27FC236}">
+                <a16:creationId xmlns:a16="http://schemas.microsoft.com/office/drawing/2014/main" id="{5D45F6D2-BD5D-F44F-C359-69B6C9A4A296}"/>
+              </a:ext>
+            </a:extLst>
+          </p:cNvPr>
+          <p:cNvSpPr txBox="1"/>
+          <p:nvPr/>
+        </p:nvSpPr>
+        <p:spPr>
+          <a:xfrm>
+            <a:off x="4153501" y="4536461"/>
+            <a:ext cx="274380" cy="338554"/>
+          </a:xfrm>
+          <a:prstGeom prst="rect">
+            <a:avLst/>
+          </a:prstGeom>
+          <a:noFill/>
+        </p:spPr>
+        <p:txBody>
+          <a:bodyPr wrap="square" rtlCol="0">
+            <a:spAutoFit/>
+          </a:bodyPr>
+          <a:lstStyle/>
+          <a:p>
+            <a:pPr algn="ctr"/>
+            <a:r>
+              <a:rPr lang="en-US" sz="1600" dirty="0"/>
+              <a:t>N</a:t>
+            </a:r>
+            <a:endParaRPr lang="en-US" sz="1400" dirty="0"/>
+          </a:p>
+        </p:txBody>
+      </p:sp>
+      <p:grpSp>
+        <p:nvGrpSpPr>
+          <p:cNvPr id="42" name="Group 41">
+            <a:extLst>
+              <a:ext uri="{FF2B5EF4-FFF2-40B4-BE49-F238E27FC236}">
+                <a16:creationId xmlns:a16="http://schemas.microsoft.com/office/drawing/2014/main" id="{304BD3CD-C0CE-5CDD-82D2-34C71A787BF2}"/>
+              </a:ext>
+            </a:extLst>
+          </p:cNvPr>
+          <p:cNvGrpSpPr/>
+          <p:nvPr/>
+        </p:nvGrpSpPr>
+        <p:grpSpPr>
+          <a:xfrm>
+            <a:off x="5920691" y="3906977"/>
+            <a:ext cx="2021830" cy="1485653"/>
+            <a:chOff x="5920691" y="3906977"/>
+            <a:chExt cx="2021830" cy="1485653"/>
+          </a:xfrm>
+        </p:grpSpPr>
+        <p:sp>
+          <p:nvSpPr>
+            <p:cNvPr id="30" name="TextBox 29">
+              <a:extLst>
+                <a:ext uri="{FF2B5EF4-FFF2-40B4-BE49-F238E27FC236}">
+                  <a16:creationId xmlns:a16="http://schemas.microsoft.com/office/drawing/2014/main" id="{32BB6253-E57F-2C95-0A74-D79867691420}"/>
+                </a:ext>
+              </a:extLst>
+            </p:cNvPr>
+            <p:cNvSpPr txBox="1"/>
+            <p:nvPr/>
+          </p:nvSpPr>
+          <p:spPr>
+            <a:xfrm>
+              <a:off x="6308109" y="3906977"/>
+              <a:ext cx="1256044" cy="461665"/>
+            </a:xfrm>
+            <a:prstGeom prst="rect">
+              <a:avLst/>
+            </a:prstGeom>
+            <a:noFill/>
+          </p:spPr>
+          <p:txBody>
+            <a:bodyPr wrap="square" rtlCol="0">
+              <a:spAutoFit/>
+            </a:bodyPr>
+            <a:lstStyle/>
+            <a:p>
+              <a:pPr algn="ctr"/>
+              <a:r>
+                <a:rPr lang="en-US" sz="2400" b="1" dirty="0">
+                  <a:solidFill>
+                    <a:schemeClr val="accent1">
+                      <a:lumMod val="75000"/>
+                    </a:schemeClr>
+                  </a:solidFill>
+                </a:rPr>
+                <a:t>500ft</a:t>
+              </a:r>
+            </a:p>
+          </p:txBody>
+        </p:sp>
+        <p:sp>
+          <p:nvSpPr>
+            <p:cNvPr id="31" name="TextBox 30">
+              <a:extLst>
+                <a:ext uri="{FF2B5EF4-FFF2-40B4-BE49-F238E27FC236}">
+                  <a16:creationId xmlns:a16="http://schemas.microsoft.com/office/drawing/2014/main" id="{AC041029-1460-D39F-C660-CD34F73F2FB0}"/>
+                </a:ext>
+              </a:extLst>
+            </p:cNvPr>
+            <p:cNvSpPr txBox="1"/>
+            <p:nvPr/>
+          </p:nvSpPr>
+          <p:spPr>
+            <a:xfrm>
+              <a:off x="5920691" y="4807855"/>
+              <a:ext cx="2021830" cy="584775"/>
+            </a:xfrm>
+            <a:prstGeom prst="rect">
+              <a:avLst/>
+            </a:prstGeom>
+            <a:noFill/>
+          </p:spPr>
+          <p:txBody>
+            <a:bodyPr wrap="square" rtlCol="0">
+              <a:spAutoFit/>
+            </a:bodyPr>
+            <a:lstStyle/>
+            <a:p>
+              <a:pPr algn="ctr"/>
+              <a:r>
+                <a:rPr lang="en-US" sz="1600" dirty="0"/>
+                <a:t>From person, vessel, vehicle or structure</a:t>
+              </a:r>
+              <a:endParaRPr lang="en-US" sz="1400" dirty="0"/>
+            </a:p>
+          </p:txBody>
+        </p:sp>
+        <p:grpSp>
+          <p:nvGrpSpPr>
+            <p:cNvPr id="36" name="Group 35">
+              <a:extLst>
+                <a:ext uri="{FF2B5EF4-FFF2-40B4-BE49-F238E27FC236}">
+                  <a16:creationId xmlns:a16="http://schemas.microsoft.com/office/drawing/2014/main" id="{D7E8C3BB-438C-227B-3F9D-CFDD8046846F}"/>
+                </a:ext>
+              </a:extLst>
+            </p:cNvPr>
+            <p:cNvGrpSpPr/>
+            <p:nvPr/>
+          </p:nvGrpSpPr>
+          <p:grpSpPr>
+            <a:xfrm>
+              <a:off x="6402181" y="4308694"/>
+              <a:ext cx="1055642" cy="1055642"/>
+              <a:chOff x="8886924" y="3267307"/>
+              <a:chExt cx="1327593" cy="1327593"/>
+            </a:xfrm>
+          </p:grpSpPr>
+          <p:pic>
+            <p:nvPicPr>
+              <p:cNvPr id="34" name="Picture 33">
+                <a:extLst>
+                  <a:ext uri="{FF2B5EF4-FFF2-40B4-BE49-F238E27FC236}">
+                    <a16:creationId xmlns:a16="http://schemas.microsoft.com/office/drawing/2014/main" id="{A5999488-D2DB-0FF4-5B6A-BA928551E494}"/>
+                  </a:ext>
+                </a:extLst>
+              </p:cNvPr>
+              <p:cNvPicPr>
+                <a:picLocks noChangeAspect="1"/>
+              </p:cNvPicPr>
+              <p:nvPr/>
+            </p:nvPicPr>
+            <p:blipFill>
+              <a:blip r:embed="rId4"/>
+              <a:stretch>
+                <a:fillRect/>
+              </a:stretch>
+            </p:blipFill>
+            <p:spPr>
+              <a:xfrm>
+                <a:off x="9339368" y="3506118"/>
+                <a:ext cx="422704" cy="451265"/>
+              </a:xfrm>
+              <a:prstGeom prst="rect">
+                <a:avLst/>
+              </a:prstGeom>
+            </p:spPr>
+          </p:pic>
+          <p:sp>
+            <p:nvSpPr>
+              <p:cNvPr id="35" name="Chord 34">
+                <a:extLst>
+                  <a:ext uri="{FF2B5EF4-FFF2-40B4-BE49-F238E27FC236}">
+                    <a16:creationId xmlns:a16="http://schemas.microsoft.com/office/drawing/2014/main" id="{B9485F4B-CB2D-46CC-478E-BF3AE8E2CDE6}"/>
+                  </a:ext>
+                </a:extLst>
+              </p:cNvPr>
+              <p:cNvSpPr/>
+              <p:nvPr/>
+            </p:nvSpPr>
+            <p:spPr>
+              <a:xfrm rot="5400000">
+                <a:off x="8886924" y="3267307"/>
+                <a:ext cx="1327593" cy="1327593"/>
+              </a:xfrm>
+              <a:prstGeom prst="chord">
+                <a:avLst>
+                  <a:gd name="adj1" fmla="val 5407576"/>
+                  <a:gd name="adj2" fmla="val 16200000"/>
+                </a:avLst>
+              </a:prstGeom>
+              <a:solidFill>
+                <a:schemeClr val="accent1">
+                  <a:alpha val="30000"/>
+                </a:schemeClr>
+              </a:solidFill>
+            </p:spPr>
+            <p:style>
+              <a:lnRef idx="2">
+                <a:schemeClr val="accent1">
+                  <a:shade val="15000"/>
+                </a:schemeClr>
+              </a:lnRef>
+              <a:fillRef idx="1">
+                <a:schemeClr val="accent1"/>
+              </a:fillRef>
+              <a:effectRef idx="0">
+                <a:schemeClr val="accent1"/>
+              </a:effectRef>
+              <a:fontRef idx="minor">
+                <a:schemeClr val="lt1"/>
+              </a:fontRef>
+            </p:style>
+            <p:txBody>
+              <a:bodyPr rtlCol="0" anchor="ctr"/>
+              <a:lstStyle/>
+              <a:p>
+                <a:pPr algn="ctr"/>
+                <a:endParaRPr lang="en-US"/>
+              </a:p>
+            </p:txBody>
+          </p:sp>
+        </p:grpSp>
+      </p:grpSp>
+      <p:cxnSp>
+        <p:nvCxnSpPr>
+          <p:cNvPr id="39" name="Straight Arrow Connector 38">
+            <a:extLst>
+              <a:ext uri="{FF2B5EF4-FFF2-40B4-BE49-F238E27FC236}">
+                <a16:creationId xmlns:a16="http://schemas.microsoft.com/office/drawing/2014/main" id="{1EB98A30-3C0A-8425-83B3-F4088D489CA2}"/>
+              </a:ext>
+            </a:extLst>
+          </p:cNvPr>
+          <p:cNvCxnSpPr>
+            <a:cxnSpLocks/>
+          </p:cNvCxnSpPr>
+          <p:nvPr/>
+        </p:nvCxnSpPr>
+        <p:spPr>
+          <a:xfrm>
+            <a:off x="4506310" y="4485122"/>
+            <a:ext cx="0" cy="743827"/>
+          </a:xfrm>
+          <a:prstGeom prst="straightConnector1">
+            <a:avLst/>
+          </a:prstGeom>
+          <a:ln w="63500">
+            <a:solidFill>
+              <a:srgbClr val="C00000"/>
+            </a:solidFill>
+            <a:tailEnd type="triangle"/>
+          </a:ln>
+        </p:spPr>
+        <p:style>
+          <a:lnRef idx="2">
+            <a:schemeClr val="accent1"/>
+          </a:lnRef>
+          <a:fillRef idx="0">
+            <a:schemeClr val="accent1"/>
+          </a:fillRef>
+          <a:effectRef idx="1">
+            <a:schemeClr val="accent1"/>
+          </a:effectRef>
+          <a:fontRef idx="minor">
+            <a:schemeClr val="tx1"/>
+          </a:fontRef>
+        </p:style>
+      </p:cxnSp>
     </p:spTree>
     <p:extLst>
       <p:ext uri="{BB962C8B-B14F-4D97-AF65-F5344CB8AC3E}">

</xml_diff>

<commit_message>
redesigned VFR Altitudes for legibility
</commit_message>
<xml_diff>
--- a/ui/docs/Tiles.pptx
+++ b/ui/docs/Tiles.pptx
@@ -216,7 +216,7 @@
           <a:p>
             <a:fld id="{33ED5609-1730-904A-B815-DF633E0B1232}" type="datetimeFigureOut">
               <a:rPr lang="en-US" smtClean="0"/>
-              <a:t>1/26/26</a:t>
+              <a:t>1/27/26</a:t>
             </a:fld>
             <a:endParaRPr lang="en-US"/>
           </a:p>
@@ -822,7 +822,7 @@
           <a:p>
             <a:fld id="{46DA5C4A-B072-FB48-84F0-865EE8F0D843}" type="datetimeFigureOut">
               <a:rPr lang="en-US" smtClean="0"/>
-              <a:t>1/26/26</a:t>
+              <a:t>1/27/26</a:t>
             </a:fld>
             <a:endParaRPr lang="en-US"/>
           </a:p>
@@ -1020,7 +1020,7 @@
           <a:p>
             <a:fld id="{46DA5C4A-B072-FB48-84F0-865EE8F0D843}" type="datetimeFigureOut">
               <a:rPr lang="en-US" smtClean="0"/>
-              <a:t>1/26/26</a:t>
+              <a:t>1/27/26</a:t>
             </a:fld>
             <a:endParaRPr lang="en-US"/>
           </a:p>
@@ -1228,7 +1228,7 @@
           <a:p>
             <a:fld id="{46DA5C4A-B072-FB48-84F0-865EE8F0D843}" type="datetimeFigureOut">
               <a:rPr lang="en-US" smtClean="0"/>
-              <a:t>1/26/26</a:t>
+              <a:t>1/27/26</a:t>
             </a:fld>
             <a:endParaRPr lang="en-US"/>
           </a:p>
@@ -1426,7 +1426,7 @@
           <a:p>
             <a:fld id="{46DA5C4A-B072-FB48-84F0-865EE8F0D843}" type="datetimeFigureOut">
               <a:rPr lang="en-US" smtClean="0"/>
-              <a:t>1/26/26</a:t>
+              <a:t>1/27/26</a:t>
             </a:fld>
             <a:endParaRPr lang="en-US"/>
           </a:p>
@@ -1701,7 +1701,7 @@
           <a:p>
             <a:fld id="{46DA5C4A-B072-FB48-84F0-865EE8F0D843}" type="datetimeFigureOut">
               <a:rPr lang="en-US" smtClean="0"/>
-              <a:t>1/26/26</a:t>
+              <a:t>1/27/26</a:t>
             </a:fld>
             <a:endParaRPr lang="en-US"/>
           </a:p>
@@ -1966,7 +1966,7 @@
           <a:p>
             <a:fld id="{46DA5C4A-B072-FB48-84F0-865EE8F0D843}" type="datetimeFigureOut">
               <a:rPr lang="en-US" smtClean="0"/>
-              <a:t>1/26/26</a:t>
+              <a:t>1/27/26</a:t>
             </a:fld>
             <a:endParaRPr lang="en-US"/>
           </a:p>
@@ -2378,7 +2378,7 @@
           <a:p>
             <a:fld id="{46DA5C4A-B072-FB48-84F0-865EE8F0D843}" type="datetimeFigureOut">
               <a:rPr lang="en-US" smtClean="0"/>
-              <a:t>1/26/26</a:t>
+              <a:t>1/27/26</a:t>
             </a:fld>
             <a:endParaRPr lang="en-US"/>
           </a:p>
@@ -2519,7 +2519,7 @@
           <a:p>
             <a:fld id="{46DA5C4A-B072-FB48-84F0-865EE8F0D843}" type="datetimeFigureOut">
               <a:rPr lang="en-US" smtClean="0"/>
-              <a:t>1/26/26</a:t>
+              <a:t>1/27/26</a:t>
             </a:fld>
             <a:endParaRPr lang="en-US"/>
           </a:p>
@@ -2632,7 +2632,7 @@
           <a:p>
             <a:fld id="{46DA5C4A-B072-FB48-84F0-865EE8F0D843}" type="datetimeFigureOut">
               <a:rPr lang="en-US" smtClean="0"/>
-              <a:t>1/26/26</a:t>
+              <a:t>1/27/26</a:t>
             </a:fld>
             <a:endParaRPr lang="en-US"/>
           </a:p>
@@ -2943,7 +2943,7 @@
           <a:p>
             <a:fld id="{46DA5C4A-B072-FB48-84F0-865EE8F0D843}" type="datetimeFigureOut">
               <a:rPr lang="en-US" smtClean="0"/>
-              <a:t>1/26/26</a:t>
+              <a:t>1/27/26</a:t>
             </a:fld>
             <a:endParaRPr lang="en-US"/>
           </a:p>
@@ -3231,7 +3231,7 @@
           <a:p>
             <a:fld id="{46DA5C4A-B072-FB48-84F0-865EE8F0D843}" type="datetimeFigureOut">
               <a:rPr lang="en-US" smtClean="0"/>
-              <a:t>1/26/26</a:t>
+              <a:t>1/27/26</a:t>
             </a:fld>
             <a:endParaRPr lang="en-US"/>
           </a:p>
@@ -3472,7 +3472,7 @@
           <a:p>
             <a:fld id="{46DA5C4A-B072-FB48-84F0-865EE8F0D843}" type="datetimeFigureOut">
               <a:rPr lang="en-US" smtClean="0"/>
-              <a:t>1/26/26</a:t>
+              <a:t>1/27/26</a:t>
             </a:fld>
             <a:endParaRPr lang="en-US"/>
           </a:p>
@@ -8313,10 +8313,10 @@
       </p:sp>
       <p:sp>
         <p:nvSpPr>
-          <p:cNvPr id="4" name="TextBox 3">
-            <a:extLst>
-              <a:ext uri="{FF2B5EF4-FFF2-40B4-BE49-F238E27FC236}">
-                <a16:creationId xmlns:a16="http://schemas.microsoft.com/office/drawing/2014/main" id="{E0EDC34D-EACC-D35C-9A9C-364E532C0C20}"/>
+          <p:cNvPr id="5" name="TextBox 4">
+            <a:extLst>
+              <a:ext uri="{FF2B5EF4-FFF2-40B4-BE49-F238E27FC236}">
+                <a16:creationId xmlns:a16="http://schemas.microsoft.com/office/drawing/2014/main" id="{4FB04210-CD5E-0A51-5BE5-3296E85A806B}"/>
               </a:ext>
             </a:extLst>
           </p:cNvPr>
@@ -8325,8 +8325,8 @@
         </p:nvSpPr>
         <p:spPr>
           <a:xfrm>
-            <a:off x="6381008" y="2274838"/>
-            <a:ext cx="1488062" cy="2308324"/>
+            <a:off x="4658533" y="1972101"/>
+            <a:ext cx="1343454" cy="3099375"/>
           </a:xfrm>
           <a:prstGeom prst="rect">
             <a:avLst/>
@@ -8339,59 +8339,93 @@
           </a:bodyPr>
           <a:lstStyle/>
           <a:p>
-            <a:r>
-              <a:rPr lang="en-US" u="sng" dirty="0"/>
-              <a:t>0°-179°</a:t>
-            </a:r>
-            <a:br>
+            <a:pPr algn="r">
+              <a:lnSpc>
+                <a:spcPts val="3400"/>
+              </a:lnSpc>
+            </a:pPr>
+            <a:r>
               <a:rPr lang="en-US" dirty="0"/>
-            </a:br>
-            <a:br>
+              <a:t>4,500</a:t>
+            </a:r>
+          </a:p>
+          <a:p>
+            <a:pPr algn="r">
+              <a:lnSpc>
+                <a:spcPts val="3400"/>
+              </a:lnSpc>
+            </a:pPr>
+            <a:r>
+              <a:rPr lang="en-US" sz="2400" dirty="0"/>
+              <a:t>6,500</a:t>
+            </a:r>
+            <a:endParaRPr lang="en-US" sz="2800" dirty="0"/>
+          </a:p>
+          <a:p>
+            <a:pPr algn="r">
+              <a:lnSpc>
+                <a:spcPts val="3400"/>
+              </a:lnSpc>
+            </a:pPr>
+            <a:r>
+              <a:rPr lang="en-US" sz="2800" dirty="0"/>
+              <a:t>8,500</a:t>
+            </a:r>
+            <a:endParaRPr lang="en-US" sz="3000" dirty="0"/>
+          </a:p>
+          <a:p>
+            <a:pPr algn="r">
+              <a:lnSpc>
+                <a:spcPts val="3400"/>
+              </a:lnSpc>
+            </a:pPr>
+            <a:r>
+              <a:rPr lang="en-US" sz="2800" dirty="0"/>
+              <a:t>10,500</a:t>
+            </a:r>
+          </a:p>
+          <a:p>
+            <a:pPr algn="r">
+              <a:lnSpc>
+                <a:spcPts val="3400"/>
+              </a:lnSpc>
+            </a:pPr>
+            <a:r>
+              <a:rPr lang="en-US" sz="2400" dirty="0"/>
+              <a:t>12,500</a:t>
+            </a:r>
+          </a:p>
+          <a:p>
+            <a:pPr algn="r">
+              <a:lnSpc>
+                <a:spcPts val="3400"/>
+              </a:lnSpc>
+            </a:pPr>
+            <a:r>
               <a:rPr lang="en-US" dirty="0"/>
-            </a:br>
-            <a:r>
-              <a:rPr lang="en-US" dirty="0"/>
-              <a:t>3,500</a:t>
-            </a:r>
-          </a:p>
-          <a:p>
-            <a:r>
-              <a:rPr lang="en-US" dirty="0"/>
-              <a:t>5,500</a:t>
-            </a:r>
-          </a:p>
-          <a:p>
-            <a:r>
-              <a:rPr lang="en-US" dirty="0"/>
-              <a:t>7,500</a:t>
-            </a:r>
-          </a:p>
-          <a:p>
-            <a:r>
-              <a:rPr lang="en-US" dirty="0"/>
-              <a:t>9,500</a:t>
-            </a:r>
-          </a:p>
-          <a:p>
+              <a:t>14,500</a:t>
+            </a:r>
+            <a:endParaRPr lang="en-US" sz="2400" dirty="0"/>
+          </a:p>
+          <a:p>
+            <a:pPr algn="r">
+              <a:lnSpc>
+                <a:spcPts val="3400"/>
+              </a:lnSpc>
+            </a:pPr>
             <a:r>
               <a:rPr lang="en-US" dirty="0"/>
               <a:t>…</a:t>
             </a:r>
           </a:p>
-          <a:p>
-            <a:r>
-              <a:rPr lang="en-US" dirty="0"/>
-              <a:t>Odd,500</a:t>
-            </a:r>
-          </a:p>
-        </p:txBody>
-      </p:sp>
-      <p:sp>
-        <p:nvSpPr>
-          <p:cNvPr id="5" name="TextBox 4">
-            <a:extLst>
-              <a:ext uri="{FF2B5EF4-FFF2-40B4-BE49-F238E27FC236}">
-                <a16:creationId xmlns:a16="http://schemas.microsoft.com/office/drawing/2014/main" id="{4FB04210-CD5E-0A51-5BE5-3296E85A806B}"/>
+        </p:txBody>
+      </p:sp>
+      <p:sp>
+        <p:nvSpPr>
+          <p:cNvPr id="8" name="TextBox 7">
+            <a:extLst>
+              <a:ext uri="{FF2B5EF4-FFF2-40B4-BE49-F238E27FC236}">
+                <a16:creationId xmlns:a16="http://schemas.microsoft.com/office/drawing/2014/main" id="{BA08CE1E-0083-B1E8-D70C-4C10D7A40AA5}"/>
               </a:ext>
             </a:extLst>
           </p:cNvPr>
@@ -8400,8 +8434,44 @@
         </p:nvSpPr>
         <p:spPr>
           <a:xfrm>
-            <a:off x="4903083" y="2274838"/>
-            <a:ext cx="1488062" cy="2308324"/>
+            <a:off x="4519814" y="4720238"/>
+            <a:ext cx="678573" cy="369332"/>
+          </a:xfrm>
+          <a:prstGeom prst="rect">
+            <a:avLst/>
+          </a:prstGeom>
+          <a:noFill/>
+        </p:spPr>
+        <p:txBody>
+          <a:bodyPr wrap="square">
+            <a:spAutoFit/>
+          </a:bodyPr>
+          <a:lstStyle/>
+          <a:p>
+            <a:r>
+              <a:rPr lang="en-US" u="sng" dirty="0"/>
+              <a:t>180°</a:t>
+            </a:r>
+            <a:endParaRPr lang="en-US" dirty="0"/>
+          </a:p>
+        </p:txBody>
+      </p:sp>
+      <p:sp>
+        <p:nvSpPr>
+          <p:cNvPr id="11" name="TextBox 10">
+            <a:extLst>
+              <a:ext uri="{FF2B5EF4-FFF2-40B4-BE49-F238E27FC236}">
+                <a16:creationId xmlns:a16="http://schemas.microsoft.com/office/drawing/2014/main" id="{CC082251-D911-CD43-25CE-303D52C2BA0C}"/>
+              </a:ext>
+            </a:extLst>
+          </p:cNvPr>
+          <p:cNvSpPr txBox="1"/>
+          <p:nvPr/>
+        </p:nvSpPr>
+        <p:spPr>
+          <a:xfrm>
+            <a:off x="6224596" y="1972101"/>
+            <a:ext cx="1343454" cy="3099375"/>
           </a:xfrm>
           <a:prstGeom prst="rect">
             <a:avLst/>
@@ -8414,58 +8484,93 @@
           </a:bodyPr>
           <a:lstStyle/>
           <a:p>
-            <a:r>
-              <a:rPr lang="en-US" u="sng" dirty="0"/>
-              <a:t>180°-359°</a:t>
-            </a:r>
-          </a:p>
-          <a:p>
-            <a:endParaRPr lang="en-US" u="sng" dirty="0"/>
-          </a:p>
-          <a:p>
+            <a:pPr>
+              <a:lnSpc>
+                <a:spcPts val="3400"/>
+              </a:lnSpc>
+            </a:pPr>
             <a:r>
               <a:rPr lang="en-US" dirty="0"/>
-              <a:t>4,500</a:t>
-            </a:r>
-          </a:p>
-          <a:p>
+              <a:t>3,500</a:t>
+            </a:r>
+          </a:p>
+          <a:p>
+            <a:pPr>
+              <a:lnSpc>
+                <a:spcPts val="3400"/>
+              </a:lnSpc>
+            </a:pPr>
+            <a:r>
+              <a:rPr lang="en-US" sz="2400" dirty="0"/>
+              <a:t>5,500</a:t>
+            </a:r>
+            <a:endParaRPr lang="en-US" sz="2800" dirty="0"/>
+          </a:p>
+          <a:p>
+            <a:pPr>
+              <a:lnSpc>
+                <a:spcPts val="3400"/>
+              </a:lnSpc>
+            </a:pPr>
+            <a:r>
+              <a:rPr lang="en-US" sz="2800" dirty="0"/>
+              <a:t>7,500</a:t>
+            </a:r>
+            <a:endParaRPr lang="en-US" sz="3000" dirty="0"/>
+          </a:p>
+          <a:p>
+            <a:pPr>
+              <a:lnSpc>
+                <a:spcPts val="3400"/>
+              </a:lnSpc>
+            </a:pPr>
+            <a:r>
+              <a:rPr lang="en-US" sz="2800" dirty="0"/>
+              <a:t>9,500</a:t>
+            </a:r>
+          </a:p>
+          <a:p>
+            <a:pPr>
+              <a:lnSpc>
+                <a:spcPts val="3400"/>
+              </a:lnSpc>
+            </a:pPr>
+            <a:r>
+              <a:rPr lang="en-US" sz="2400" dirty="0"/>
+              <a:t>11,500</a:t>
+            </a:r>
+          </a:p>
+          <a:p>
+            <a:pPr>
+              <a:lnSpc>
+                <a:spcPts val="3400"/>
+              </a:lnSpc>
+            </a:pPr>
             <a:r>
               <a:rPr lang="en-US" dirty="0"/>
-              <a:t>6,500</a:t>
-            </a:r>
-          </a:p>
-          <a:p>
-            <a:r>
-              <a:rPr lang="en-US" dirty="0"/>
-              <a:t>8,500</a:t>
-            </a:r>
-          </a:p>
-          <a:p>
-            <a:r>
-              <a:rPr lang="en-US" dirty="0"/>
-              <a:t>10,500</a:t>
-            </a:r>
-          </a:p>
-          <a:p>
+              <a:t>13,500</a:t>
+            </a:r>
+            <a:endParaRPr lang="en-US" sz="2400" dirty="0"/>
+          </a:p>
+          <a:p>
+            <a:pPr>
+              <a:lnSpc>
+                <a:spcPts val="3400"/>
+              </a:lnSpc>
+            </a:pPr>
             <a:r>
               <a:rPr lang="en-US" dirty="0"/>
               <a:t>…</a:t>
             </a:r>
           </a:p>
-          <a:p>
-            <a:r>
-              <a:rPr lang="en-US" dirty="0"/>
-              <a:t>Evn,500</a:t>
-            </a:r>
-          </a:p>
-        </p:txBody>
-      </p:sp>
-      <p:sp>
-        <p:nvSpPr>
-          <p:cNvPr id="7" name="TextBox 6">
-            <a:extLst>
-              <a:ext uri="{FF2B5EF4-FFF2-40B4-BE49-F238E27FC236}">
-                <a16:creationId xmlns:a16="http://schemas.microsoft.com/office/drawing/2014/main" id="{EC434732-C1BF-9343-0343-EAD9E6CC2040}"/>
+        </p:txBody>
+      </p:sp>
+      <p:sp>
+        <p:nvSpPr>
+          <p:cNvPr id="13" name="TextBox 12">
+            <a:extLst>
+              <a:ext uri="{FF2B5EF4-FFF2-40B4-BE49-F238E27FC236}">
+                <a16:creationId xmlns:a16="http://schemas.microsoft.com/office/drawing/2014/main" id="{63A8EC4A-50F0-285C-9493-E8700F8FD378}"/>
               </a:ext>
             </a:extLst>
           </p:cNvPr>
@@ -8474,8 +8579,8 @@
         </p:nvSpPr>
         <p:spPr>
           <a:xfrm>
-            <a:off x="4519812" y="1836006"/>
-            <a:ext cx="1010094" cy="307777"/>
+            <a:off x="7159920" y="1836007"/>
+            <a:ext cx="613457" cy="369332"/>
           </a:xfrm>
           <a:prstGeom prst="rect">
             <a:avLst/>
@@ -8483,14 +8588,50 @@
           <a:noFill/>
         </p:spPr>
         <p:txBody>
-          <a:bodyPr wrap="square" rtlCol="0">
+          <a:bodyPr wrap="square">
             <a:spAutoFit/>
           </a:bodyPr>
           <a:lstStyle/>
           <a:p>
-            <a:r>
-              <a:rPr lang="en-US" sz="1400" dirty="0"/>
-              <a:t>&gt; 3,000ft</a:t>
+            <a:pPr algn="r"/>
+            <a:r>
+              <a:rPr lang="en-US" u="sng" dirty="0"/>
+              <a:t>0°</a:t>
+            </a:r>
+          </a:p>
+        </p:txBody>
+      </p:sp>
+      <p:sp>
+        <p:nvSpPr>
+          <p:cNvPr id="14" name="TextBox 13">
+            <a:extLst>
+              <a:ext uri="{FF2B5EF4-FFF2-40B4-BE49-F238E27FC236}">
+                <a16:creationId xmlns:a16="http://schemas.microsoft.com/office/drawing/2014/main" id="{952DE397-C2DF-2E3A-DCB5-B5EEEB295536}"/>
+              </a:ext>
+            </a:extLst>
+          </p:cNvPr>
+          <p:cNvSpPr txBox="1"/>
+          <p:nvPr/>
+        </p:nvSpPr>
+        <p:spPr>
+          <a:xfrm>
+            <a:off x="4519814" y="1836007"/>
+            <a:ext cx="678573" cy="369332"/>
+          </a:xfrm>
+          <a:prstGeom prst="rect">
+            <a:avLst/>
+          </a:prstGeom>
+          <a:noFill/>
+        </p:spPr>
+        <p:txBody>
+          <a:bodyPr wrap="square">
+            <a:spAutoFit/>
+          </a:bodyPr>
+          <a:lstStyle/>
+          <a:p>
+            <a:r>
+              <a:rPr lang="en-US" u="sng" dirty="0"/>
+              <a:t>359°</a:t>
             </a:r>
           </a:p>
         </p:txBody>

</xml_diff>